<commit_message>
Remove slide from layout
Amos King @adkron <amos@binarynoggin.com>
</commit_message>
<xml_diff>
--- a/spec/fixtures/minimal.pptx
+++ b/spec/fixtures/minimal.pptx
@@ -8,17 +8,6 @@
 
 <file path=ppt/slideLayouts/slideLayoutBasic.xml><?xml version="1.0" encoding="utf-8"?>
 <p:sldLayout xmlns:a="http://schemas.openxmlformats.org/drawingml/2006/main" xmlns:r="http://schemas.openxmlformats.org/officeDocument/2006/relationships" xmlns:p="http://schemas.openxmlformats.org/presentationml/2006/main" type="blank" preserve="1">
-  <p:cSld name="Blank">
-    <p:spTree>
-      <p:nvGrpSpPr>
-        <p:cNvPr id="1" name=""/>
-        <p:cNvGrpSpPr/>
-        <p:nvPr/>
-      </p:nvGrpSpPr>
-      <p:grpSpPr>
-      </p:grpSpPr>
-    </p:spTree>
-  </p:cSld>
 </p:sldLayout>
 </file>
 

</xml_diff>